<commit_message>
Adding 5-fold cross-validation on BindingDB data + updated figures
</commit_message>
<xml_diff>
--- a/Images/degree_ratio_distributions.pptx
+++ b/Images/degree_ratio_distributions.pptx
@@ -2993,8 +2993,8 @@
         </p:blipFill>
         <p:spPr>
           <a:xfrm>
-            <a:off x="148951" y="743344"/>
-            <a:ext cx="4418976" cy="3026224"/>
+            <a:off x="392133" y="826789"/>
+            <a:ext cx="3900535" cy="2671183"/>
           </a:xfrm>
           <a:prstGeom prst="rect">
             <a:avLst/>
@@ -3023,8 +3023,8 @@
         </p:blipFill>
         <p:spPr>
           <a:xfrm>
-            <a:off x="240244" y="3844135"/>
-            <a:ext cx="4236390" cy="3013865"/>
+            <a:off x="465106" y="3934077"/>
+            <a:ext cx="3802478" cy="2705169"/>
           </a:xfrm>
           <a:prstGeom prst="rect">
             <a:avLst/>
@@ -3053,8 +3053,8 @@
         </p:blipFill>
         <p:spPr>
           <a:xfrm>
-            <a:off x="4619703" y="743344"/>
-            <a:ext cx="4253607" cy="2874968"/>
+            <a:off x="4896702" y="792992"/>
+            <a:ext cx="3900058" cy="2636008"/>
           </a:xfrm>
           <a:prstGeom prst="rect">
             <a:avLst/>
@@ -3083,8 +3083,8 @@
         </p:blipFill>
         <p:spPr>
           <a:xfrm>
-            <a:off x="4584341" y="3787098"/>
-            <a:ext cx="4288969" cy="3070902"/>
+            <a:off x="4842041" y="3830361"/>
+            <a:ext cx="4009380" cy="2870716"/>
           </a:xfrm>
           <a:prstGeom prst="rect">
             <a:avLst/>
@@ -3105,7 +3105,7 @@
         </p:nvSpPr>
         <p:spPr>
           <a:xfrm>
-            <a:off x="2225040" y="620233"/>
+            <a:off x="2172307" y="677294"/>
             <a:ext cx="763351" cy="307777"/>
           </a:xfrm>
           <a:prstGeom prst="rect">
@@ -3145,7 +3145,7 @@
         </p:nvSpPr>
         <p:spPr>
           <a:xfrm>
-            <a:off x="1378655" y="3488300"/>
+            <a:off x="1510486" y="3271152"/>
             <a:ext cx="2456122" cy="276999"/>
           </a:xfrm>
           <a:prstGeom prst="rect">
@@ -3185,7 +3185,7 @@
         </p:nvSpPr>
         <p:spPr>
           <a:xfrm>
-            <a:off x="1378655" y="6581001"/>
+            <a:off x="1398701" y="6362247"/>
             <a:ext cx="2456122" cy="276999"/>
           </a:xfrm>
           <a:prstGeom prst="rect">
@@ -3225,7 +3225,7 @@
         </p:nvSpPr>
         <p:spPr>
           <a:xfrm>
-            <a:off x="5872900" y="3523774"/>
+            <a:off x="5960242" y="3301789"/>
             <a:ext cx="2456122" cy="276999"/>
           </a:xfrm>
           <a:prstGeom prst="rect">
@@ -3265,7 +3265,7 @@
         </p:nvSpPr>
         <p:spPr>
           <a:xfrm>
-            <a:off x="5872900" y="6581001"/>
+            <a:off x="5960242" y="6467341"/>
             <a:ext cx="2456122" cy="276999"/>
           </a:xfrm>
           <a:prstGeom prst="rect">
@@ -3305,7 +3305,7 @@
         </p:nvSpPr>
         <p:spPr>
           <a:xfrm rot="16200000">
-            <a:off x="-414198" y="1601489"/>
+            <a:off x="-230364" y="1616159"/>
             <a:ext cx="1509835" cy="276999"/>
           </a:xfrm>
           <a:prstGeom prst="rect">
@@ -3345,7 +3345,7 @@
         </p:nvSpPr>
         <p:spPr>
           <a:xfrm rot="16200000">
-            <a:off x="4003285" y="1601489"/>
+            <a:off x="4258203" y="1601489"/>
             <a:ext cx="1509835" cy="276999"/>
           </a:xfrm>
           <a:prstGeom prst="rect">
@@ -3385,7 +3385,7 @@
         </p:nvSpPr>
         <p:spPr>
           <a:xfrm rot="16200000">
-            <a:off x="4003285" y="4646379"/>
+            <a:off x="4237200" y="4655824"/>
             <a:ext cx="1509835" cy="276999"/>
           </a:xfrm>
           <a:prstGeom prst="rect">
@@ -3425,7 +3425,7 @@
         </p:nvSpPr>
         <p:spPr>
           <a:xfrm rot="16200000">
-            <a:off x="-376174" y="4625465"/>
+            <a:off x="-250322" y="4636994"/>
             <a:ext cx="1509835" cy="276999"/>
           </a:xfrm>
           <a:prstGeom prst="rect">
@@ -3705,7 +3705,7 @@
         </p:nvSpPr>
         <p:spPr>
           <a:xfrm>
-            <a:off x="6676163" y="662889"/>
+            <a:off x="6710024" y="677294"/>
             <a:ext cx="763351" cy="307777"/>
           </a:xfrm>
           <a:prstGeom prst="rect">
@@ -3745,7 +3745,7 @@
         </p:nvSpPr>
         <p:spPr>
           <a:xfrm>
-            <a:off x="2167051" y="3703262"/>
+            <a:off x="2228220" y="3787098"/>
             <a:ext cx="707438" cy="307777"/>
           </a:xfrm>
           <a:prstGeom prst="rect">
@@ -3785,7 +3785,7 @@
         </p:nvSpPr>
         <p:spPr>
           <a:xfrm>
-            <a:off x="6719285" y="3728577"/>
+            <a:off x="6781489" y="3759623"/>
             <a:ext cx="938037" cy="307777"/>
           </a:xfrm>
           <a:prstGeom prst="rect">

</xml_diff>